<commit_message>
check in labs folder
</commit_message>
<xml_diff>
--- a/draft_outline.pptx
+++ b/draft_outline.pptx
@@ -5446,7 +5446,44 @@
             </a:pPr>
             <a:r>
               <a:rPr lang="en-US" dirty="0" smtClean="0"/>
-              <a:t>How GemFire manages data</a:t>
+              <a:t>GemFire Distributed Membership</a:t>
+            </a:r>
+          </a:p>
+          <a:p>
+            <a:pPr lvl="1">
+              <a:lnSpc>
+                <a:spcPct val="150000"/>
+              </a:lnSpc>
+              <a:spcBef>
+                <a:spcPts val="0"/>
+              </a:spcBef>
+              <a:buFont typeface="Proxima Nova"/>
+              <a:buChar char="●"/>
+            </a:pPr>
+            <a:r>
+              <a:rPr lang="en-US" smtClean="0"/>
+              <a:t>GemFire Locators</a:t>
+            </a:r>
+            <a:endParaRPr lang="en-US" dirty="0" smtClean="0"/>
+          </a:p>
+          <a:p>
+            <a:pPr lvl="1">
+              <a:lnSpc>
+                <a:spcPct val="150000"/>
+              </a:lnSpc>
+              <a:spcBef>
+                <a:spcPts val="0"/>
+              </a:spcBef>
+              <a:buFont typeface="Proxima Nova"/>
+              <a:buChar char="●"/>
+            </a:pPr>
+            <a:r>
+              <a:rPr lang="en-US" dirty="0" smtClean="0"/>
+              <a:t>How </a:t>
+            </a:r>
+            <a:r>
+              <a:rPr lang="en-US" dirty="0" smtClean="0"/>
+              <a:t>GemFire manages data</a:t>
             </a:r>
             <a:endParaRPr lang="en-US" dirty="0"/>
           </a:p>
@@ -5701,7 +5738,6 @@
               <a:rPr lang="en-US" dirty="0" smtClean="0"/>
               <a:t>Lab: Managing Data  (2)</a:t>
             </a:r>
-            <a:endParaRPr lang="en-US" dirty="0" smtClean="0"/>
           </a:p>
           <a:p>
             <a:pPr lvl="1">

</xml_diff>